<commit_message>
docs and service files
</commit_message>
<xml_diff>
--- a/Дипломные доки/presentations/TouchDispatchВКР-new.pptx
+++ b/Дипломные доки/presentations/TouchDispatchВКР-new.pptx
@@ -7206,7 +7206,7 @@
           </a:ln>
           <a:extLst>
             <a:ext uri="{C572A759-6A51-4108-AA02-DFA0A04FC94B}">
-              <ma14:wrappingTextBoxFlag xmlns="" xmlns:m="http://schemas.openxmlformats.org/officeDocument/2006/math" xmlns:a14="http://schemas.microsoft.com/office/drawing/2010/main" xmlns:ma14="http://schemas.microsoft.com/office/mac/drawingml/2011/main" val="1"/>
+              <ma14:wrappingTextBoxFlag xmlns:ma14="http://schemas.microsoft.com/office/mac/drawingml/2011/main" xmlns:a14="http://schemas.microsoft.com/office/drawing/2010/main" xmlns:m="http://schemas.openxmlformats.org/officeDocument/2006/math" xmlns="" val="1"/>
             </a:ext>
           </a:extLst>
         </p:spPr>
@@ -7284,7 +7284,7 @@
           </a:ln>
           <a:extLst>
             <a:ext uri="{C572A759-6A51-4108-AA02-DFA0A04FC94B}">
-              <ma14:wrappingTextBoxFlag xmlns="" xmlns:m="http://schemas.openxmlformats.org/officeDocument/2006/math" xmlns:a14="http://schemas.microsoft.com/office/drawing/2010/main" xmlns:ma14="http://schemas.microsoft.com/office/mac/drawingml/2011/main" val="1"/>
+              <ma14:wrappingTextBoxFlag xmlns:ma14="http://schemas.microsoft.com/office/mac/drawingml/2011/main" xmlns:a14="http://schemas.microsoft.com/office/drawing/2010/main" xmlns:m="http://schemas.openxmlformats.org/officeDocument/2006/math" xmlns="" val="1"/>
             </a:ext>
           </a:extLst>
         </p:spPr>
@@ -8384,15 +8384,7 @@
           <a:p>
             <a:r>
               <a:rPr lang="ru-RU" sz="1800" dirty="0"/>
-              <a:t>Команды по высоте и </a:t>
-            </a:r>
-            <a:r>
-              <a:rPr lang="ru-RU" sz="1800" dirty="0" err="1"/>
-              <a:t>ызлету</a:t>
-            </a:r>
-            <a:r>
-              <a:rPr lang="ru-RU" sz="1800" dirty="0"/>
-              <a:t> отдаются на контрольной панели</a:t>
+              <a:t>Команды по высоте и взлету отдаются на контрольной панели</a:t>
             </a:r>
           </a:p>
           <a:p>
@@ -9343,7 +9335,7 @@
           <a:p>
             <a:r>
               <a:rPr lang="ru-RU" sz="2800" dirty="0"/>
-              <a:t>Научная новизна / практическая значимость</a:t>
+              <a:t>Практическая значимость</a:t>
             </a:r>
             <a:endParaRPr lang="ru-RU" dirty="0"/>
           </a:p>
@@ -15905,6 +15897,21 @@
 </file>
 
 <file path=customXml/item1.xml><?xml version="1.0" encoding="utf-8"?>
+<?mso-contentType ?>
+<FormTemplates xmlns="http://schemas.microsoft.com/sharepoint/v3/contenttype/forms">
+  <Display>DocumentLibraryForm</Display>
+  <Edit>DocumentLibraryForm</Edit>
+  <New>DocumentLibraryForm</New>
+</FormTemplates>
+</file>
+
+<file path=customXml/item2.xml><?xml version="1.0" encoding="utf-8"?>
+<p:properties xmlns:p="http://schemas.microsoft.com/office/2006/metadata/properties" xmlns:xsi="http://www.w3.org/2001/XMLSchema-instance" xmlns:pc="http://schemas.microsoft.com/office/infopath/2007/PartnerControls">
+  <documentManagement/>
+</p:properties>
+</file>
+
+<file path=customXml/item3.xml><?xml version="1.0" encoding="utf-8"?>
 <ct:contentTypeSchema xmlns:ct="http://schemas.microsoft.com/office/2006/metadata/contentType" xmlns:ma="http://schemas.microsoft.com/office/2006/metadata/properties/metaAttributes" ct:_="" ma:_="" ma:contentTypeName="Документ" ma:contentTypeID="0x0101002A9C74E6E830D74E9B0FDDB4017A5417" ma:contentTypeVersion="13" ma:contentTypeDescription="Создание документа." ma:contentTypeScope="" ma:versionID="d4e423622451d608a8a05f4da7a1e1a2">
   <xsd:schema xmlns:xsd="http://www.w3.org/2001/XMLSchema" xmlns:xs="http://www.w3.org/2001/XMLSchema" xmlns:p="http://schemas.microsoft.com/office/2006/metadata/properties" xmlns:ns2="9875bd71-cde8-496c-a136-433f55d5e6d0" xmlns:ns3="e96afe77-3acb-4328-97fc-408e1bde3ecd" targetNamespace="http://schemas.microsoft.com/office/2006/metadata/properties" ma:root="true" ma:fieldsID="4831203c63c08b9f52ea6d3ee0d7a96e" ns2:_="" ns3:_="">
     <xsd:import namespace="9875bd71-cde8-496c-a136-433f55d5e6d0"/>
@@ -16127,36 +16134,10 @@
 </ct:contentTypeSchema>
 </file>
 
-<file path=customXml/item2.xml><?xml version="1.0" encoding="utf-8"?>
-<p:properties xmlns:p="http://schemas.microsoft.com/office/2006/metadata/properties" xmlns:xsi="http://www.w3.org/2001/XMLSchema-instance" xmlns:pc="http://schemas.microsoft.com/office/infopath/2007/PartnerControls">
-  <documentManagement/>
-</p:properties>
-</file>
-
-<file path=customXml/item3.xml><?xml version="1.0" encoding="utf-8"?>
-<?mso-contentType ?>
-<FormTemplates xmlns="http://schemas.microsoft.com/sharepoint/v3/contenttype/forms">
-  <Display>DocumentLibraryForm</Display>
-  <Edit>DocumentLibraryForm</Edit>
-  <New>DocumentLibraryForm</New>
-</FormTemplates>
-</file>
-
 <file path=customXml/itemProps1.xml><?xml version="1.0" encoding="utf-8"?>
-<ds:datastoreItem xmlns:ds="http://schemas.openxmlformats.org/officeDocument/2006/customXml" ds:itemID="{4D4651DD-DCCC-4759-B2F6-7F520BDCC2B9}">
+<ds:datastoreItem xmlns:ds="http://schemas.openxmlformats.org/officeDocument/2006/customXml" ds:itemID="{B34386AA-1848-4C75-B336-1053927CB025}">
   <ds:schemaRefs>
-    <ds:schemaRef ds:uri="http://schemas.microsoft.com/office/2006/metadata/contentType"/>
-    <ds:schemaRef ds:uri="http://schemas.microsoft.com/office/2006/metadata/properties/metaAttributes"/>
-    <ds:schemaRef ds:uri="http://www.w3.org/2001/XMLSchema"/>
-    <ds:schemaRef ds:uri="http://schemas.microsoft.com/office/2006/metadata/properties"/>
-    <ds:schemaRef ds:uri="9875bd71-cde8-496c-a136-433f55d5e6d0"/>
-    <ds:schemaRef ds:uri="e96afe77-3acb-4328-97fc-408e1bde3ecd"/>
-    <ds:schemaRef ds:uri="http://schemas.microsoft.com/office/2006/documentManagement/types"/>
-    <ds:schemaRef ds:uri="http://schemas.microsoft.com/office/infopath/2007/PartnerControls"/>
-    <ds:schemaRef ds:uri="http://schemas.openxmlformats.org/package/2006/metadata/core-properties"/>
-    <ds:schemaRef ds:uri="http://purl.org/dc/elements/1.1/"/>
-    <ds:schemaRef ds:uri="http://purl.org/dc/terms/"/>
-    <ds:schemaRef ds:uri="http://schemas.microsoft.com/internal/obd"/>
+    <ds:schemaRef ds:uri="http://schemas.microsoft.com/sharepoint/v3/contenttype/forms"/>
   </ds:schemaRefs>
 </ds:datastoreItem>
 </file>
@@ -16179,9 +16160,20 @@
 </file>
 
 <file path=customXml/itemProps3.xml><?xml version="1.0" encoding="utf-8"?>
-<ds:datastoreItem xmlns:ds="http://schemas.openxmlformats.org/officeDocument/2006/customXml" ds:itemID="{B34386AA-1848-4C75-B336-1053927CB025}">
+<ds:datastoreItem xmlns:ds="http://schemas.openxmlformats.org/officeDocument/2006/customXml" ds:itemID="{4D4651DD-DCCC-4759-B2F6-7F520BDCC2B9}">
   <ds:schemaRefs>
-    <ds:schemaRef ds:uri="http://schemas.microsoft.com/sharepoint/v3/contenttype/forms"/>
+    <ds:schemaRef ds:uri="http://schemas.microsoft.com/office/2006/metadata/contentType"/>
+    <ds:schemaRef ds:uri="http://schemas.microsoft.com/office/2006/metadata/properties/metaAttributes"/>
+    <ds:schemaRef ds:uri="http://www.w3.org/2001/XMLSchema"/>
+    <ds:schemaRef ds:uri="http://schemas.microsoft.com/office/2006/metadata/properties"/>
+    <ds:schemaRef ds:uri="9875bd71-cde8-496c-a136-433f55d5e6d0"/>
+    <ds:schemaRef ds:uri="e96afe77-3acb-4328-97fc-408e1bde3ecd"/>
+    <ds:schemaRef ds:uri="http://schemas.microsoft.com/office/2006/documentManagement/types"/>
+    <ds:schemaRef ds:uri="http://schemas.microsoft.com/office/infopath/2007/PartnerControls"/>
+    <ds:schemaRef ds:uri="http://schemas.openxmlformats.org/package/2006/metadata/core-properties"/>
+    <ds:schemaRef ds:uri="http://purl.org/dc/elements/1.1/"/>
+    <ds:schemaRef ds:uri="http://purl.org/dc/terms/"/>
+    <ds:schemaRef ds:uri="http://schemas.microsoft.com/internal/obd"/>
   </ds:schemaRefs>
 </ds:datastoreItem>
 </file>
</xml_diff>